<commit_message>
Update PT-SNE Gated Mixture of Sparse Experts (PT-MoE).pptx
</commit_message>
<xml_diff>
--- a/PT-SNE Gated Mixture of Sparse Experts (PT-MoE).pptx
+++ b/PT-SNE Gated Mixture of Sparse Experts (PT-MoE).pptx
@@ -5397,7 +5397,7 @@
       <dgm:spPr/>
     </dgm:pt>
     <dgm:pt modelId="{19C19775-BC6F-4B55-A37B-96B4906DB53A}" type="pres">
-      <dgm:prSet presAssocID="{DEBF5677-D744-475D-B5E9-3C59B283AF81}" presName="bgRect" presStyleLbl="bgShp" presStyleIdx="4" presStyleCnt="5" custLinFactNeighborX="-803" custLinFactNeighborY="9192"/>
+      <dgm:prSet presAssocID="{DEBF5677-D744-475D-B5E9-3C59B283AF81}" presName="bgRect" presStyleLbl="bgShp" presStyleIdx="4" presStyleCnt="5" custLinFactNeighborY="1396"/>
       <dgm:spPr/>
     </dgm:pt>
     <dgm:pt modelId="{E112C692-537A-4F25-BF3C-A3C2CFD6679A}" type="pres">
@@ -36189,8 +36189,8 @@
         </p:nvSpPr>
         <p:spPr>
           <a:xfrm>
-            <a:off x="639098" y="2418735"/>
-            <a:ext cx="5132439" cy="3811742"/>
+            <a:off x="639098" y="2091193"/>
+            <a:ext cx="5132439" cy="4139284"/>
           </a:xfrm>
         </p:spPr>
         <p:txBody>
@@ -36205,8 +36205,57 @@
                   <a:srgbClr val="FFFFFF"/>
                 </a:solidFill>
               </a:rPr>
-              <a:t>The difficulty in training deep neural networks begins and ends with the fact that the design principle on which many are founded, full connectivity, contributes to a quadratic increase in calculable parameters as the number of input dimensions and parameters increases.</a:t>
+              <a:t>The difficulty in training deep neural networks begins and ends with the principle on which they are founded</a:t>
             </a:r>
+          </a:p>
+          <a:p>
+            <a:r>
+              <a:rPr lang="en-US" dirty="0">
+                <a:solidFill>
+                  <a:srgbClr val="FFFFFF"/>
+                </a:solidFill>
+              </a:rPr>
+              <a:t>FCL adds a quadratic increase in calculable parameters with increased nodes.</a:t>
+            </a:r>
+          </a:p>
+          <a:p>
+            <a:r>
+              <a:rPr lang="en-US" dirty="0">
+                <a:solidFill>
+                  <a:srgbClr val="FFFFFF"/>
+                </a:solidFill>
+              </a:rPr>
+              <a:t>Problem</a:t>
+            </a:r>
+          </a:p>
+          <a:p>
+            <a:pPr lvl="1"/>
+            <a:r>
+              <a:rPr lang="en-US" dirty="0">
+                <a:solidFill>
+                  <a:srgbClr val="FFFFFF"/>
+                </a:solidFill>
+              </a:rPr>
+              <a:t>Models are too large. </a:t>
+            </a:r>
+          </a:p>
+          <a:p>
+            <a:pPr lvl="1"/>
+            <a:r>
+              <a:rPr lang="en-US" dirty="0">
+                <a:solidFill>
+                  <a:srgbClr val="FFFFFF"/>
+                </a:solidFill>
+              </a:rPr>
+              <a:t>Pt-SNE aims to fix this while improving accuracy.</a:t>
+            </a:r>
+          </a:p>
+          <a:p>
+            <a:endParaRPr lang="en-US" dirty="0">
+              <a:solidFill>
+                <a:srgbClr val="FFFFFF"/>
+              </a:solidFill>
+            </a:endParaRPr>
           </a:p>
         </p:txBody>
       </p:sp>
@@ -37094,7 +37143,7 @@
             <p:ph idx="1"/>
             <p:extLst>
               <p:ext uri="{D42A27DB-BD31-4B8C-83A1-F6EECF244321}">
-                <p14:modId xmlns:p14="http://schemas.microsoft.com/office/powerpoint/2010/main" val="817929463"/>
+                <p14:modId xmlns:p14="http://schemas.microsoft.com/office/powerpoint/2010/main" val="3039592868"/>
               </p:ext>
             </p:extLst>
           </p:nvPr>
@@ -40963,7 +41012,7 @@
           <a:p>
             <a:r>
               <a:rPr lang="en-US" dirty="0"/>
-              <a:t>Typical Mixture of Experts</a:t>
+              <a:t>Gated Mixture of Experts</a:t>
             </a:r>
           </a:p>
         </p:txBody>
@@ -40990,7 +41039,7 @@
         </p:blipFill>
         <p:spPr>
           <a:xfrm>
-            <a:off x="430581" y="3999937"/>
+            <a:off x="2129908" y="3915162"/>
             <a:ext cx="1158212" cy="868665"/>
           </a:xfrm>
           <a:prstGeom prst="rect">
@@ -41016,7 +41065,7 @@
         </p:nvCxnSpPr>
         <p:spPr>
           <a:xfrm flipV="1">
-            <a:off x="1588793" y="3413617"/>
+            <a:off x="3288120" y="3328842"/>
             <a:ext cx="1383007" cy="1020653"/>
           </a:xfrm>
           <a:prstGeom prst="line">
@@ -41056,7 +41105,7 @@
         </p:nvCxnSpPr>
         <p:spPr>
           <a:xfrm>
-            <a:off x="1588793" y="4434270"/>
+            <a:off x="3288120" y="4349495"/>
             <a:ext cx="1383007" cy="1049708"/>
           </a:xfrm>
           <a:prstGeom prst="line">
@@ -41092,7 +41141,7 @@
         </p:nvGrpSpPr>
         <p:grpSpPr>
           <a:xfrm>
-            <a:off x="4029471" y="3098119"/>
+            <a:off x="5728798" y="3013344"/>
             <a:ext cx="4394890" cy="3287678"/>
             <a:chOff x="1972071" y="3031221"/>
             <a:chExt cx="4394890" cy="3287678"/>
@@ -43356,7 +43405,7 @@
         </p:nvCxnSpPr>
         <p:spPr>
           <a:xfrm flipV="1">
-            <a:off x="6360402" y="4739459"/>
+            <a:off x="8059729" y="4654684"/>
             <a:ext cx="662190" cy="989085"/>
           </a:xfrm>
           <a:prstGeom prst="line">
@@ -43395,7 +43444,7 @@
         </p:nvCxnSpPr>
         <p:spPr>
           <a:xfrm>
-            <a:off x="6336792" y="3823968"/>
+            <a:off x="8036119" y="3739193"/>
             <a:ext cx="685800" cy="915491"/>
           </a:xfrm>
           <a:prstGeom prst="line">
@@ -43431,7 +43480,7 @@
         </p:nvSpPr>
         <p:spPr>
           <a:xfrm>
-            <a:off x="2971800" y="3239316"/>
+            <a:off x="4671127" y="3154541"/>
             <a:ext cx="320040" cy="348602"/>
           </a:xfrm>
           <a:prstGeom prst="rect">
@@ -43477,7 +43526,7 @@
         </p:nvSpPr>
         <p:spPr>
           <a:xfrm>
-            <a:off x="2971800" y="5309677"/>
+            <a:off x="4671127" y="5224902"/>
             <a:ext cx="320040" cy="348602"/>
           </a:xfrm>
           <a:prstGeom prst="rect">
@@ -43527,7 +43576,7 @@
         </p:nvCxnSpPr>
         <p:spPr>
           <a:xfrm>
-            <a:off x="3291840" y="3413617"/>
+            <a:off x="4991167" y="3328842"/>
             <a:ext cx="779342" cy="10341"/>
           </a:xfrm>
           <a:prstGeom prst="line">
@@ -43566,7 +43615,7 @@
         </p:nvCxnSpPr>
         <p:spPr>
           <a:xfrm flipV="1">
-            <a:off x="3263366" y="5325723"/>
+            <a:off x="4962693" y="5240948"/>
             <a:ext cx="766105" cy="161726"/>
           </a:xfrm>
           <a:prstGeom prst="line">
@@ -43606,7 +43655,7 @@
         </p:nvCxnSpPr>
         <p:spPr>
           <a:xfrm>
-            <a:off x="3291840" y="3413617"/>
+            <a:off x="4991167" y="3328842"/>
             <a:ext cx="779342" cy="624958"/>
           </a:xfrm>
           <a:prstGeom prst="line">
@@ -43646,7 +43695,7 @@
         </p:nvCxnSpPr>
         <p:spPr>
           <a:xfrm>
-            <a:off x="3291840" y="5483978"/>
+            <a:off x="4991167" y="5399203"/>
             <a:ext cx="737631" cy="456362"/>
           </a:xfrm>
           <a:prstGeom prst="line">
@@ -43682,7 +43731,7 @@
         </p:nvSpPr>
         <p:spPr>
           <a:xfrm>
-            <a:off x="2971800" y="5234001"/>
+            <a:off x="4671127" y="5149226"/>
             <a:ext cx="82296" cy="75676"/>
           </a:xfrm>
           <a:prstGeom prst="triangle">
@@ -43728,7 +43777,7 @@
         </p:nvSpPr>
         <p:spPr>
           <a:xfrm>
-            <a:off x="2971800" y="3158235"/>
+            <a:off x="4671127" y="3073460"/>
             <a:ext cx="82296" cy="75676"/>
           </a:xfrm>
           <a:prstGeom prst="triangle">
@@ -43760,6 +43809,36 @@
           </a:p>
         </p:txBody>
       </p:sp>
+      <p:pic>
+        <p:nvPicPr>
+          <p:cNvPr id="125" name="Picture 124">
+            <a:extLst>
+              <a:ext uri="{FF2B5EF4-FFF2-40B4-BE49-F238E27FC236}">
+                <a16:creationId xmlns:a16="http://schemas.microsoft.com/office/drawing/2014/main" id="{1B4F1CE9-4207-E64A-9276-6714110823B6}"/>
+              </a:ext>
+            </a:extLst>
+          </p:cNvPr>
+          <p:cNvPicPr>
+            <a:picLocks noChangeAspect="1"/>
+          </p:cNvPicPr>
+          <p:nvPr/>
+        </p:nvPicPr>
+        <p:blipFill>
+          <a:blip r:embed="rId3"/>
+          <a:stretch>
+            <a:fillRect/>
+          </a:stretch>
+        </p:blipFill>
+        <p:spPr>
+          <a:xfrm>
+            <a:off x="1575093" y="3726094"/>
+            <a:ext cx="867304" cy="1246799"/>
+          </a:xfrm>
+          <a:prstGeom prst="rect">
+            <a:avLst/>
+          </a:prstGeom>
+        </p:spPr>
+      </p:pic>
     </p:spTree>
     <p:extLst>
       <p:ext uri="{BB962C8B-B14F-4D97-AF65-F5344CB8AC3E}">

</xml_diff>